<commit_message>
:pencil2: Fix typo in 22th presentation
</commit_message>
<xml_diff>
--- a/22/yongki/SQL.pptx
+++ b/22/yongki/SQL.pptx
@@ -254,7 +254,7 @@
           <a:p>
             <a:fld id="{278A5395-7299-4714-9E5C-8983F2B9A6E7}" type="datetimeFigureOut">
               <a:rPr lang="ko-KR" altLang="en-US" smtClean="0"/>
-              <a:t>2022-06-02</a:t>
+              <a:t>2022-06-05</a:t>
             </a:fld>
             <a:endParaRPr lang="ko-KR" altLang="en-US"/>
           </a:p>
@@ -4684,6 +4684,100 @@
           </a:p>
         </p:txBody>
       </p:sp>
+      <p:pic>
+        <p:nvPicPr>
+          <p:cNvPr id="1026" name="Picture 2" descr="SQL 레벨업 : DB 성능 최적화를 위한 SQL 실전 가이드">
+            <a:extLst>
+              <a:ext uri="{FF2B5EF4-FFF2-40B4-BE49-F238E27FC236}">
+                <a16:creationId xmlns:a16="http://schemas.microsoft.com/office/drawing/2014/main" id="{13381745-B4B3-6772-8A81-16523D15BDE2}"/>
+              </a:ext>
+            </a:extLst>
+          </p:cNvPr>
+          <p:cNvPicPr>
+            <a:picLocks noChangeAspect="1" noChangeArrowheads="1"/>
+          </p:cNvPicPr>
+          <p:nvPr/>
+        </p:nvPicPr>
+        <p:blipFill>
+          <a:blip r:embed="rId2">
+            <a:extLst>
+              <a:ext uri="{28A0092B-C50C-407E-A947-70E740481C1C}">
+                <a14:useLocalDpi xmlns:a14="http://schemas.microsoft.com/office/drawing/2010/main" val="0"/>
+              </a:ext>
+            </a:extLst>
+          </a:blip>
+          <a:srcRect/>
+          <a:stretch>
+            <a:fillRect/>
+          </a:stretch>
+        </p:blipFill>
+        <p:spPr bwMode="auto">
+          <a:xfrm>
+            <a:off x="3635896" y="965057"/>
+            <a:ext cx="2036808" cy="2968648"/>
+          </a:xfrm>
+          <a:prstGeom prst="rect">
+            <a:avLst/>
+          </a:prstGeom>
+          <a:noFill/>
+          <a:extLst>
+            <a:ext uri="{909E8E84-426E-40DD-AFC4-6F175D3DCCD1}">
+              <a14:hiddenFill xmlns:a14="http://schemas.microsoft.com/office/drawing/2010/main">
+                <a:solidFill>
+                  <a:srgbClr val="FFFFFF"/>
+                </a:solidFill>
+              </a14:hiddenFill>
+            </a:ext>
+          </a:extLst>
+        </p:spPr>
+      </p:pic>
+      <p:pic>
+        <p:nvPicPr>
+          <p:cNvPr id="1028" name="Picture 4" descr="SQL AntiPatterns">
+            <a:extLst>
+              <a:ext uri="{FF2B5EF4-FFF2-40B4-BE49-F238E27FC236}">
+                <a16:creationId xmlns:a16="http://schemas.microsoft.com/office/drawing/2014/main" id="{B7798446-9B1F-24B2-74F3-1D6CB1F3EB48}"/>
+              </a:ext>
+            </a:extLst>
+          </p:cNvPr>
+          <p:cNvPicPr>
+            <a:picLocks noChangeAspect="1" noChangeArrowheads="1"/>
+          </p:cNvPicPr>
+          <p:nvPr/>
+        </p:nvPicPr>
+        <p:blipFill>
+          <a:blip r:embed="rId3">
+            <a:extLst>
+              <a:ext uri="{28A0092B-C50C-407E-A947-70E740481C1C}">
+                <a14:useLocalDpi xmlns:a14="http://schemas.microsoft.com/office/drawing/2010/main" val="0"/>
+              </a:ext>
+            </a:extLst>
+          </a:blip>
+          <a:srcRect/>
+          <a:stretch>
+            <a:fillRect/>
+          </a:stretch>
+        </p:blipFill>
+        <p:spPr bwMode="auto">
+          <a:xfrm>
+            <a:off x="5949383" y="965057"/>
+            <a:ext cx="2263594" cy="2968648"/>
+          </a:xfrm>
+          <a:prstGeom prst="rect">
+            <a:avLst/>
+          </a:prstGeom>
+          <a:noFill/>
+          <a:extLst>
+            <a:ext uri="{909E8E84-426E-40DD-AFC4-6F175D3DCCD1}">
+              <a14:hiddenFill xmlns:a14="http://schemas.microsoft.com/office/drawing/2010/main">
+                <a:solidFill>
+                  <a:srgbClr val="FFFFFF"/>
+                </a:solidFill>
+              </a14:hiddenFill>
+            </a:ext>
+          </a:extLst>
+        </p:spPr>
+      </p:pic>
     </p:spTree>
   </p:cSld>
   <p:clrMapOvr>
@@ -6480,36 +6574,6 @@
           <a:chExt cx="0" cy="0"/>
         </a:xfrm>
       </p:grpSpPr>
-      <p:pic>
-        <p:nvPicPr>
-          <p:cNvPr id="13" name="그림 12">
-            <a:extLst>
-              <a:ext uri="{FF2B5EF4-FFF2-40B4-BE49-F238E27FC236}">
-                <a16:creationId xmlns:a16="http://schemas.microsoft.com/office/drawing/2014/main" id="{682D8BCE-5177-9A42-A7F6-2DA189485526}"/>
-              </a:ext>
-            </a:extLst>
-          </p:cNvPr>
-          <p:cNvPicPr>
-            <a:picLocks noChangeAspect="1"/>
-          </p:cNvPicPr>
-          <p:nvPr/>
-        </p:nvPicPr>
-        <p:blipFill>
-          <a:blip r:embed="rId2"/>
-          <a:stretch>
-            <a:fillRect/>
-          </a:stretch>
-        </p:blipFill>
-        <p:spPr>
-          <a:xfrm>
-            <a:off x="1907704" y="4569505"/>
-            <a:ext cx="5080062" cy="1826539"/>
-          </a:xfrm>
-          <a:prstGeom prst="rect">
-            <a:avLst/>
-          </a:prstGeom>
-        </p:spPr>
-      </p:pic>
       <p:sp>
         <p:nvSpPr>
           <p:cNvPr id="5122" name="Rectangle 2">
@@ -6553,7 +6617,7 @@
                   <a:schemeClr val="tx1"/>
                 </a:solidFill>
               </a:rPr>
-              <a:t>구문의 처리 순서</a:t>
+              <a:t>구문의 잘못된 처리 순서 예시</a:t>
             </a:r>
             <a:endParaRPr lang="ko-KR" altLang="ko-KR" sz="2000">
               <a:solidFill>
@@ -6609,12 +6673,42 @@
           </a:extLst>
         </p:spPr>
       </p:cxnSp>
+      <p:pic>
+        <p:nvPicPr>
+          <p:cNvPr id="4" name="그림 3">
+            <a:extLst>
+              <a:ext uri="{FF2B5EF4-FFF2-40B4-BE49-F238E27FC236}">
+                <a16:creationId xmlns:a16="http://schemas.microsoft.com/office/drawing/2014/main" id="{2CC74358-0C2B-6645-34DE-C424ED616981}"/>
+              </a:ext>
+            </a:extLst>
+          </p:cNvPr>
+          <p:cNvPicPr>
+            <a:picLocks noChangeAspect="1"/>
+          </p:cNvPicPr>
+          <p:nvPr/>
+        </p:nvPicPr>
+        <p:blipFill>
+          <a:blip r:embed="rId2"/>
+          <a:stretch>
+            <a:fillRect/>
+          </a:stretch>
+        </p:blipFill>
+        <p:spPr>
+          <a:xfrm>
+            <a:off x="147474" y="4152390"/>
+            <a:ext cx="4424526" cy="1522805"/>
+          </a:xfrm>
+          <a:prstGeom prst="rect">
+            <a:avLst/>
+          </a:prstGeom>
+        </p:spPr>
+      </p:pic>
       <p:sp>
         <p:nvSpPr>
-          <p:cNvPr id="6" name="TextBox 5">
+          <p:cNvPr id="14" name="TextBox 13">
             <a:extLst>
               <a:ext uri="{FF2B5EF4-FFF2-40B4-BE49-F238E27FC236}">
-                <a16:creationId xmlns:a16="http://schemas.microsoft.com/office/drawing/2014/main" id="{D03EED3C-D047-8FD5-2D92-4843A9C1DF64}"/>
+                <a16:creationId xmlns:a16="http://schemas.microsoft.com/office/drawing/2014/main" id="{B0BD9FC6-4D33-D3CA-7858-6557178C1E8E}"/>
               </a:ext>
             </a:extLst>
           </p:cNvPr>
@@ -6626,7 +6720,7 @@
         <p:spPr bwMode="auto">
           <a:xfrm>
             <a:off x="565684" y="1375225"/>
-            <a:ext cx="8229600" cy="738664"/>
+            <a:ext cx="8229600" cy="307777"/>
           </a:xfrm>
           <a:prstGeom prst="rect">
             <a:avLst/>
@@ -6814,44 +6908,6 @@
                 <a:latin typeface="맑은 고딕" panose="020B0503020000020004" pitchFamily="50" charset="-127"/>
                 <a:ea typeface="맑은 고딕" panose="020B0503020000020004" pitchFamily="50" charset="-127"/>
               </a:rPr>
-              <a:t>키워드와 표현식을 묶어서 절이라고 표현한다</a:t>
-            </a:r>
-            <a:r>
-              <a:rPr lang="en-US" altLang="ko-KR" sz="1400">
-                <a:solidFill>
-                  <a:srgbClr val="000000"/>
-                </a:solidFill>
-                <a:latin typeface="맑은 고딕" panose="020B0503020000020004" pitchFamily="50" charset="-127"/>
-                <a:ea typeface="맑은 고딕" panose="020B0503020000020004" pitchFamily="50" charset="-127"/>
-              </a:rPr>
-              <a:t>. </a:t>
-            </a:r>
-            <a:br>
-              <a:rPr lang="en-US" altLang="ko-KR" sz="1400">
-                <a:solidFill>
-                  <a:srgbClr val="000000"/>
-                </a:solidFill>
-                <a:latin typeface="맑은 고딕" panose="020B0503020000020004" pitchFamily="50" charset="-127"/>
-                <a:ea typeface="맑은 고딕" panose="020B0503020000020004" pitchFamily="50" charset="-127"/>
-              </a:rPr>
-            </a:br>
-            <a:br>
-              <a:rPr lang="en-US" altLang="ko-KR" sz="1400">
-                <a:solidFill>
-                  <a:srgbClr val="000000"/>
-                </a:solidFill>
-                <a:latin typeface="맑은 고딕" panose="020B0503020000020004" pitchFamily="50" charset="-127"/>
-                <a:ea typeface="맑은 고딕" panose="020B0503020000020004" pitchFamily="50" charset="-127"/>
-              </a:rPr>
-            </a:br>
-            <a:r>
-              <a:rPr lang="ko-KR" altLang="en-US" sz="1400">
-                <a:solidFill>
-                  <a:srgbClr val="000000"/>
-                </a:solidFill>
-                <a:latin typeface="맑은 고딕" panose="020B0503020000020004" pitchFamily="50" charset="-127"/>
-                <a:ea typeface="맑은 고딕" panose="020B0503020000020004" pitchFamily="50" charset="-127"/>
-              </a:rPr>
               <a:t>어느 절이 먼저 실행되는지를 모르면 처리 내용이나 처리 결과를 예측할 수 없다</a:t>
             </a:r>
             <a:r>
@@ -6869,10 +6925,10 @@
       </p:sp>
       <p:pic>
         <p:nvPicPr>
-          <p:cNvPr id="5" name="그림 4">
+          <p:cNvPr id="15" name="그림 14">
             <a:extLst>
               <a:ext uri="{FF2B5EF4-FFF2-40B4-BE49-F238E27FC236}">
-                <a16:creationId xmlns:a16="http://schemas.microsoft.com/office/drawing/2014/main" id="{83C927B3-D3A2-DDB3-73FE-EB8EF44A362C}"/>
+                <a16:creationId xmlns:a16="http://schemas.microsoft.com/office/drawing/2014/main" id="{9F85ED37-0C75-5EC5-6748-46C4356809DF}"/>
               </a:ext>
             </a:extLst>
           </p:cNvPr>
@@ -6889,7 +6945,7 @@
         </p:blipFill>
         <p:spPr>
           <a:xfrm>
-            <a:off x="179512" y="2353172"/>
+            <a:off x="179512" y="1916832"/>
             <a:ext cx="8004403" cy="1803039"/>
           </a:xfrm>
           <a:prstGeom prst="rect">
@@ -6897,45 +6953,293 @@
           </a:prstGeom>
         </p:spPr>
       </p:pic>
-      <p:pic>
-        <p:nvPicPr>
-          <p:cNvPr id="11" name="그래픽 10" descr="혼란스런 얼굴(윤곽선) 단색으로 채워진">
+      <p:sp>
+        <p:nvSpPr>
+          <p:cNvPr id="16" name="TextBox 15">
             <a:extLst>
               <a:ext uri="{FF2B5EF4-FFF2-40B4-BE49-F238E27FC236}">
-                <a16:creationId xmlns:a16="http://schemas.microsoft.com/office/drawing/2014/main" id="{F34BC25C-4EB1-7067-3F29-9A8DF1C17D2D}"/>
+                <a16:creationId xmlns:a16="http://schemas.microsoft.com/office/drawing/2014/main" id="{8254DCDF-3360-B38D-A9C5-AC3F0C0E8C7E}"/>
               </a:ext>
             </a:extLst>
           </p:cNvPr>
-          <p:cNvPicPr>
-            <a:picLocks noChangeAspect="1"/>
-          </p:cNvPicPr>
+          <p:cNvSpPr txBox="1">
+            <a:spLocks noChangeArrowheads="1"/>
+          </p:cNvSpPr>
           <p:nvPr/>
-        </p:nvPicPr>
-        <p:blipFill>
-          <a:blip r:embed="rId4">
-            <a:extLst>
-              <a:ext uri="{28A0092B-C50C-407E-A947-70E740481C1C}">
-                <a14:useLocalDpi xmlns:a14="http://schemas.microsoft.com/office/drawing/2010/main" val="0"/>
-              </a:ext>
-              <a:ext uri="{96DAC541-7B7A-43D3-8B79-37D633B846F1}">
-                <asvg:svgBlip xmlns:asvg="http://schemas.microsoft.com/office/drawing/2016/SVG/main" r:embed="rId5"/>
-              </a:ext>
-            </a:extLst>
-          </a:blip>
-          <a:stretch>
-            <a:fillRect/>
-          </a:stretch>
-        </p:blipFill>
-        <p:spPr>
+        </p:nvSpPr>
+        <p:spPr bwMode="auto">
           <a:xfrm>
-            <a:off x="5940152" y="5589240"/>
-            <a:ext cx="914400" cy="914400"/>
+            <a:off x="115492" y="5799937"/>
+            <a:ext cx="5608636" cy="307777"/>
           </a:xfrm>
           <a:prstGeom prst="rect">
             <a:avLst/>
           </a:prstGeom>
+          <a:noFill/>
+          <a:ln>
+            <a:noFill/>
+          </a:ln>
+          <a:extLst>
+            <a:ext uri="{909E8E84-426E-40DD-AFC4-6F175D3DCCD1}">
+              <a14:hiddenFill xmlns:a14="http://schemas.microsoft.com/office/drawing/2010/main">
+                <a:solidFill>
+                  <a:srgbClr val="FFFFFF"/>
+                </a:solidFill>
+              </a14:hiddenFill>
+            </a:ext>
+            <a:ext uri="{91240B29-F687-4F45-9708-019B960494DF}">
+              <a14:hiddenLine xmlns:a14="http://schemas.microsoft.com/office/drawing/2010/main" w="9525">
+                <a:solidFill>
+                  <a:srgbClr val="000000"/>
+                </a:solidFill>
+                <a:miter lim="800000"/>
+                <a:headEnd/>
+                <a:tailEnd/>
+              </a14:hiddenLine>
+            </a:ext>
+          </a:extLst>
         </p:spPr>
-      </p:pic>
+        <p:txBody>
+          <a:bodyPr wrap="square">
+            <a:spAutoFit/>
+          </a:bodyPr>
+          <a:lstStyle>
+            <a:lvl1pPr>
+              <a:spcBef>
+                <a:spcPct val="20000"/>
+              </a:spcBef>
+              <a:buChar char="•"/>
+              <a:defRPr sz="3200">
+                <a:solidFill>
+                  <a:schemeClr val="tx1"/>
+                </a:solidFill>
+                <a:latin typeface="Arial" panose="020B0604020202020204" pitchFamily="34" charset="0"/>
+                <a:ea typeface="Arial Unicode MS" panose="020B0604020202020204" pitchFamily="50" charset="-127"/>
+                <a:cs typeface="Arial" panose="020B0604020202020204" pitchFamily="34" charset="0"/>
+              </a:defRPr>
+            </a:lvl1pPr>
+            <a:lvl2pPr marL="742950" indent="-285750">
+              <a:spcBef>
+                <a:spcPct val="20000"/>
+              </a:spcBef>
+              <a:buChar char="–"/>
+              <a:defRPr sz="2800">
+                <a:solidFill>
+                  <a:schemeClr val="tx1"/>
+                </a:solidFill>
+                <a:latin typeface="Arial" panose="020B0604020202020204" pitchFamily="34" charset="0"/>
+                <a:ea typeface="Arial Unicode MS" panose="020B0604020202020204" pitchFamily="50" charset="-127"/>
+                <a:cs typeface="Arial" panose="020B0604020202020204" pitchFamily="34" charset="0"/>
+              </a:defRPr>
+            </a:lvl2pPr>
+            <a:lvl3pPr marL="1143000" indent="-228600">
+              <a:spcBef>
+                <a:spcPct val="20000"/>
+              </a:spcBef>
+              <a:buChar char="•"/>
+              <a:defRPr sz="2400">
+                <a:solidFill>
+                  <a:schemeClr val="tx1"/>
+                </a:solidFill>
+                <a:latin typeface="Arial" panose="020B0604020202020204" pitchFamily="34" charset="0"/>
+                <a:ea typeface="Arial Unicode MS" panose="020B0604020202020204" pitchFamily="50" charset="-127"/>
+                <a:cs typeface="Arial" panose="020B0604020202020204" pitchFamily="34" charset="0"/>
+              </a:defRPr>
+            </a:lvl3pPr>
+            <a:lvl4pPr marL="1600200" indent="-228600">
+              <a:spcBef>
+                <a:spcPct val="20000"/>
+              </a:spcBef>
+              <a:buChar char="–"/>
+              <a:defRPr sz="2000">
+                <a:solidFill>
+                  <a:schemeClr val="tx1"/>
+                </a:solidFill>
+                <a:latin typeface="Arial" panose="020B0604020202020204" pitchFamily="34" charset="0"/>
+                <a:ea typeface="Arial Unicode MS" panose="020B0604020202020204" pitchFamily="50" charset="-127"/>
+                <a:cs typeface="Arial" panose="020B0604020202020204" pitchFamily="34" charset="0"/>
+              </a:defRPr>
+            </a:lvl4pPr>
+            <a:lvl5pPr marL="2057400" indent="-228600">
+              <a:spcBef>
+                <a:spcPct val="20000"/>
+              </a:spcBef>
+              <a:buChar char="»"/>
+              <a:defRPr sz="2000">
+                <a:solidFill>
+                  <a:schemeClr val="tx1"/>
+                </a:solidFill>
+                <a:latin typeface="Arial" panose="020B0604020202020204" pitchFamily="34" charset="0"/>
+                <a:ea typeface="Arial Unicode MS" panose="020B0604020202020204" pitchFamily="50" charset="-127"/>
+                <a:cs typeface="Arial" panose="020B0604020202020204" pitchFamily="34" charset="0"/>
+              </a:defRPr>
+            </a:lvl5pPr>
+            <a:lvl6pPr marL="2514600" indent="-228600" eaLnBrk="0" fontAlgn="base" hangingPunct="0">
+              <a:spcBef>
+                <a:spcPct val="20000"/>
+              </a:spcBef>
+              <a:spcAft>
+                <a:spcPct val="0"/>
+              </a:spcAft>
+              <a:buChar char="»"/>
+              <a:defRPr sz="2000">
+                <a:solidFill>
+                  <a:schemeClr val="tx1"/>
+                </a:solidFill>
+                <a:latin typeface="Arial" panose="020B0604020202020204" pitchFamily="34" charset="0"/>
+                <a:ea typeface="Arial Unicode MS" panose="020B0604020202020204" pitchFamily="50" charset="-127"/>
+                <a:cs typeface="Arial" panose="020B0604020202020204" pitchFamily="34" charset="0"/>
+              </a:defRPr>
+            </a:lvl6pPr>
+            <a:lvl7pPr marL="2971800" indent="-228600" eaLnBrk="0" fontAlgn="base" hangingPunct="0">
+              <a:spcBef>
+                <a:spcPct val="20000"/>
+              </a:spcBef>
+              <a:spcAft>
+                <a:spcPct val="0"/>
+              </a:spcAft>
+              <a:buChar char="»"/>
+              <a:defRPr sz="2000">
+                <a:solidFill>
+                  <a:schemeClr val="tx1"/>
+                </a:solidFill>
+                <a:latin typeface="Arial" panose="020B0604020202020204" pitchFamily="34" charset="0"/>
+                <a:ea typeface="Arial Unicode MS" panose="020B0604020202020204" pitchFamily="50" charset="-127"/>
+                <a:cs typeface="Arial" panose="020B0604020202020204" pitchFamily="34" charset="0"/>
+              </a:defRPr>
+            </a:lvl7pPr>
+            <a:lvl8pPr marL="3429000" indent="-228600" eaLnBrk="0" fontAlgn="base" hangingPunct="0">
+              <a:spcBef>
+                <a:spcPct val="20000"/>
+              </a:spcBef>
+              <a:spcAft>
+                <a:spcPct val="0"/>
+              </a:spcAft>
+              <a:buChar char="»"/>
+              <a:defRPr sz="2000">
+                <a:solidFill>
+                  <a:schemeClr val="tx1"/>
+                </a:solidFill>
+                <a:latin typeface="Arial" panose="020B0604020202020204" pitchFamily="34" charset="0"/>
+                <a:ea typeface="Arial Unicode MS" panose="020B0604020202020204" pitchFamily="50" charset="-127"/>
+                <a:cs typeface="Arial" panose="020B0604020202020204" pitchFamily="34" charset="0"/>
+              </a:defRPr>
+            </a:lvl8pPr>
+            <a:lvl9pPr marL="3886200" indent="-228600" eaLnBrk="0" fontAlgn="base" hangingPunct="0">
+              <a:spcBef>
+                <a:spcPct val="20000"/>
+              </a:spcBef>
+              <a:spcAft>
+                <a:spcPct val="0"/>
+              </a:spcAft>
+              <a:buChar char="»"/>
+              <a:defRPr sz="2000">
+                <a:solidFill>
+                  <a:schemeClr val="tx1"/>
+                </a:solidFill>
+                <a:latin typeface="Arial" panose="020B0604020202020204" pitchFamily="34" charset="0"/>
+                <a:ea typeface="Arial Unicode MS" panose="020B0604020202020204" pitchFamily="50" charset="-127"/>
+                <a:cs typeface="Arial" panose="020B0604020202020204" pitchFamily="34" charset="0"/>
+              </a:defRPr>
+            </a:lvl9pPr>
+          </a:lstStyle>
+          <a:p>
+            <a:pPr eaLnBrk="1" hangingPunct="1">
+              <a:spcBef>
+                <a:spcPct val="0"/>
+              </a:spcBef>
+              <a:buNone/>
+            </a:pPr>
+            <a:r>
+              <a:rPr lang="en-US" altLang="ko-KR" sz="1400">
+                <a:solidFill>
+                  <a:srgbClr val="000000"/>
+                </a:solidFill>
+                <a:latin typeface="맑은 고딕" panose="020B0503020000020004" pitchFamily="50" charset="-127"/>
+                <a:ea typeface="맑은 고딕" panose="020B0503020000020004" pitchFamily="50" charset="-127"/>
+              </a:rPr>
+              <a:t>: WHERE </a:t>
+            </a:r>
+            <a:r>
+              <a:rPr lang="ko-KR" altLang="en-US" sz="1400">
+                <a:solidFill>
+                  <a:srgbClr val="000000"/>
+                </a:solidFill>
+                <a:latin typeface="맑은 고딕" panose="020B0503020000020004" pitchFamily="50" charset="-127"/>
+                <a:ea typeface="맑은 고딕" panose="020B0503020000020004" pitchFamily="50" charset="-127"/>
+              </a:rPr>
+              <a:t>절에 서브 쿼리</a:t>
+            </a:r>
+            <a:r>
+              <a:rPr lang="en-US" altLang="ko-KR" sz="1400">
+                <a:solidFill>
+                  <a:srgbClr val="000000"/>
+                </a:solidFill>
+                <a:latin typeface="맑은 고딕" panose="020B0503020000020004" pitchFamily="50" charset="-127"/>
+                <a:ea typeface="맑은 고딕" panose="020B0503020000020004" pitchFamily="50" charset="-127"/>
+              </a:rPr>
+              <a:t>(</a:t>
+            </a:r>
+            <a:r>
+              <a:rPr lang="ko-KR" altLang="en-US" sz="1400">
+                <a:solidFill>
+                  <a:srgbClr val="000000"/>
+                </a:solidFill>
+                <a:latin typeface="맑은 고딕" panose="020B0503020000020004" pitchFamily="50" charset="-127"/>
+                <a:ea typeface="맑은 고딕" panose="020B0503020000020004" pitchFamily="50" charset="-127"/>
+              </a:rPr>
+              <a:t>별도의 </a:t>
+            </a:r>
+            <a:r>
+              <a:rPr lang="en-US" altLang="ko-KR" sz="1400">
+                <a:solidFill>
+                  <a:srgbClr val="000000"/>
+                </a:solidFill>
+                <a:latin typeface="맑은 고딕" panose="020B0503020000020004" pitchFamily="50" charset="-127"/>
+                <a:ea typeface="맑은 고딕" panose="020B0503020000020004" pitchFamily="50" charset="-127"/>
+              </a:rPr>
+              <a:t>SELECT </a:t>
+            </a:r>
+            <a:r>
+              <a:rPr lang="ko-KR" altLang="en-US" sz="1400">
+                <a:solidFill>
+                  <a:srgbClr val="000000"/>
+                </a:solidFill>
+                <a:latin typeface="맑은 고딕" panose="020B0503020000020004" pitchFamily="50" charset="-127"/>
+                <a:ea typeface="맑은 고딕" panose="020B0503020000020004" pitchFamily="50" charset="-127"/>
+              </a:rPr>
+              <a:t>문</a:t>
+            </a:r>
+            <a:r>
+              <a:rPr lang="en-US" altLang="ko-KR" sz="1400">
+                <a:solidFill>
+                  <a:srgbClr val="000000"/>
+                </a:solidFill>
+                <a:latin typeface="맑은 고딕" panose="020B0503020000020004" pitchFamily="50" charset="-127"/>
+                <a:ea typeface="맑은 고딕" panose="020B0503020000020004" pitchFamily="50" charset="-127"/>
+              </a:rPr>
+              <a:t>)</a:t>
+            </a:r>
+            <a:r>
+              <a:rPr lang="ko-KR" altLang="en-US" sz="1400">
+                <a:solidFill>
+                  <a:srgbClr val="000000"/>
+                </a:solidFill>
+                <a:latin typeface="맑은 고딕" panose="020B0503020000020004" pitchFamily="50" charset="-127"/>
+                <a:ea typeface="맑은 고딕" panose="020B0503020000020004" pitchFamily="50" charset="-127"/>
+              </a:rPr>
+              <a:t>를 넣어서 해결 가능</a:t>
+            </a:r>
+            <a:endParaRPr lang="en-US" altLang="ko-KR" sz="1400">
+              <a:solidFill>
+                <a:srgbClr val="000000"/>
+              </a:solidFill>
+              <a:latin typeface="맑은 고딕" panose="020B0503020000020004" pitchFamily="50" charset="-127"/>
+              <a:ea typeface="맑은 고딕" panose="020B0503020000020004" pitchFamily="50" charset="-127"/>
+            </a:endParaRPr>
+          </a:p>
+        </p:txBody>
+      </p:sp>
     </p:spTree>
     <p:extLst>
       <p:ext uri="{BB962C8B-B14F-4D97-AF65-F5344CB8AC3E}">
@@ -6967,7 +7271,7 @@
                             </p:stCondLst>
                             <p:childTnLst>
                               <p:par>
-                                <p:cTn id="5" presetID="1" presetClass="entr" presetSubtype="0" fill="hold" nodeType="clickEffect">
+                                <p:cTn id="5" presetID="1" presetClass="entr" presetSubtype="0" fill="hold" grpId="0" nodeType="clickEffect">
                                   <p:stCondLst>
                                     <p:cond delay="0"/>
                                   </p:stCondLst>
@@ -6980,7 +7284,7 @@
                                           </p:stCondLst>
                                         </p:cTn>
                                         <p:tgtEl>
-                                          <p:spTgt spid="11"/>
+                                          <p:spTgt spid="16"/>
                                         </p:tgtEl>
                                         <p:attrNameLst>
                                           <p:attrName>style.visibility</p:attrName>
@@ -7020,6 +7324,9 @@
         </p:cTn>
       </p:par>
     </p:tnLst>
+    <p:bldLst>
+      <p:bldP spid="16" grpId="0"/>
+    </p:bldLst>
   </p:timing>
 </p:sld>
 </file>
@@ -12331,7 +12638,7 @@
                 <a:latin typeface="맑은 고딕" panose="020B0503020000020004" pitchFamily="50" charset="-127"/>
                 <a:ea typeface="맑은 고딕" panose="020B0503020000020004" pitchFamily="50" charset="-127"/>
               </a:rPr>
-              <a:t>SQL(Structured Query Languate)</a:t>
+              <a:t>SQL(Structured Query Language)</a:t>
             </a:r>
             <a:r>
               <a:rPr lang="ko-KR" altLang="en-US" sz="1400">
@@ -12833,12 +13140,20 @@
               <a:defRPr/>
             </a:pPr>
             <a:r>
+              <a:rPr lang="en-US" altLang="ko-KR" sz="3200">
+                <a:solidFill>
+                  <a:schemeClr val="tx1"/>
+                </a:solidFill>
+              </a:rPr>
+              <a:t>DBMS </a:t>
+            </a:r>
+            <a:r>
               <a:rPr lang="ko-KR" altLang="en-US" sz="3200">
                 <a:solidFill>
                   <a:schemeClr val="tx1"/>
                 </a:solidFill>
               </a:rPr>
-              <a:t>검색과 갱신 「메모리 사용 차이」</a:t>
+              <a:t>아키텍처</a:t>
             </a:r>
             <a:endParaRPr lang="ko-KR" altLang="ko-KR" sz="2000">
               <a:solidFill>
@@ -13190,84 +13505,6 @@
   <p:clrMapOvr>
     <a:masterClrMapping/>
   </p:clrMapOvr>
-  <p:timing>
-    <p:tnLst>
-      <p:par>
-        <p:cTn id="1" dur="indefinite" restart="never" nodeType="tmRoot">
-          <p:childTnLst>
-            <p:seq concurrent="1" nextAc="seek">
-              <p:cTn id="2" dur="indefinite" nodeType="mainSeq">
-                <p:childTnLst>
-                  <p:par>
-                    <p:cTn id="3" fill="hold">
-                      <p:stCondLst>
-                        <p:cond delay="indefinite"/>
-                      </p:stCondLst>
-                      <p:childTnLst>
-                        <p:par>
-                          <p:cTn id="4" fill="hold">
-                            <p:stCondLst>
-                              <p:cond delay="0"/>
-                            </p:stCondLst>
-                            <p:childTnLst>
-                              <p:par>
-                                <p:cTn id="5" presetID="1" presetClass="entr" presetSubtype="0" fill="hold" grpId="0" nodeType="clickEffect">
-                                  <p:stCondLst>
-                                    <p:cond delay="0"/>
-                                  </p:stCondLst>
-                                  <p:childTnLst>
-                                    <p:set>
-                                      <p:cBhvr>
-                                        <p:cTn id="6" dur="1" fill="hold">
-                                          <p:stCondLst>
-                                            <p:cond delay="0"/>
-                                          </p:stCondLst>
-                                        </p:cTn>
-                                        <p:tgtEl>
-                                          <p:spTgt spid="7"/>
-                                        </p:tgtEl>
-                                        <p:attrNameLst>
-                                          <p:attrName>style.visibility</p:attrName>
-                                        </p:attrNameLst>
-                                      </p:cBhvr>
-                                      <p:to>
-                                        <p:strVal val="visible"/>
-                                      </p:to>
-                                    </p:set>
-                                  </p:childTnLst>
-                                </p:cTn>
-                              </p:par>
-                            </p:childTnLst>
-                          </p:cTn>
-                        </p:par>
-                      </p:childTnLst>
-                    </p:cTn>
-                  </p:par>
-                </p:childTnLst>
-              </p:cTn>
-              <p:prevCondLst>
-                <p:cond evt="onPrev" delay="0">
-                  <p:tgtEl>
-                    <p:sldTgt/>
-                  </p:tgtEl>
-                </p:cond>
-              </p:prevCondLst>
-              <p:nextCondLst>
-                <p:cond evt="onNext" delay="0">
-                  <p:tgtEl>
-                    <p:sldTgt/>
-                  </p:tgtEl>
-                </p:cond>
-              </p:nextCondLst>
-            </p:seq>
-          </p:childTnLst>
-        </p:cTn>
-      </p:par>
-    </p:tnLst>
-    <p:bldLst>
-      <p:bldP spid="7" grpId="0" animBg="1"/>
-    </p:bldLst>
-  </p:timing>
 </p:sld>
 </file>
 
@@ -14412,7 +14649,7 @@
           <p:nvPr>
             <p:extLst>
               <p:ext uri="{D42A27DB-BD31-4B8C-83A1-F6EECF244321}">
-                <p14:modId xmlns:p14="http://schemas.microsoft.com/office/powerpoint/2010/main" val="4239958073"/>
+                <p14:modId xmlns:p14="http://schemas.microsoft.com/office/powerpoint/2010/main" val="4017242146"/>
               </p:ext>
             </p:extLst>
           </p:nvPr>
@@ -14715,7 +14952,7 @@
                       </a:endParaRPr>
                     </a:p>
                   </a:txBody>
-                  <a:tcPr>
+                  <a:tcPr anchor="ctr">
                     <a:lnL w="12700" cap="flat" cmpd="sng" algn="ctr">
                       <a:solidFill>
                         <a:schemeClr val="tx1"/>
@@ -14771,7 +15008,7 @@
                       </a:r>
                     </a:p>
                   </a:txBody>
-                  <a:tcPr>
+                  <a:tcPr anchor="ctr">
                     <a:lnL w="12700" cap="flat" cmpd="sng" algn="ctr">
                       <a:solidFill>
                         <a:schemeClr val="tx1"/>

</xml_diff>